<commit_message>
add OPTIONAL, identifier conversion
</commit_message>
<xml_diff>
--- a/devel/OpenC2 Schema.pptx
+++ b/devel/OpenC2 Schema.pptx
@@ -5,7 +5,7 @@
     <p:sldMasterId id="2147483660" r:id="rId1"/>
   </p:sldMasterIdLst>
   <p:notesMasterIdLst>
-    <p:notesMasterId r:id="rId14"/>
+    <p:notesMasterId r:id="rId16"/>
   </p:notesMasterIdLst>
   <p:sldIdLst>
     <p:sldId id="385" r:id="rId2"/>
@@ -20,6 +20,8 @@
     <p:sldId id="428" r:id="rId11"/>
     <p:sldId id="429" r:id="rId12"/>
     <p:sldId id="427" r:id="rId13"/>
+    <p:sldId id="430" r:id="rId14"/>
+    <p:sldId id="431" r:id="rId15"/>
   </p:sldIdLst>
   <p:sldSz cx="9144000" cy="6858000" type="screen4x3"/>
   <p:notesSz cx="6858000" cy="9144000"/>
@@ -210,7 +212,7 @@
             <a:fld id="{BEA7D905-4A79-4EB8-82BB-49D7A73CDC36}" type="datetimeFigureOut">
               <a:rPr lang="en-US" smtClean="0"/>
               <a:pPr/>
-              <a:t>8/30/2016</a:t>
+              <a:t>9/13/2016</a:t>
             </a:fld>
             <a:endParaRPr lang="en-US" dirty="0"/>
           </a:p>
@@ -1106,7 +1108,7 @@
             <a:pPr algn="ctr" eaLnBrk="1" latinLnBrk="0" hangingPunct="1"/>
             <a:fld id="{BB43FE8B-308F-4382-9655-46B1789E94EF}" type="datetime1">
               <a:rPr lang="en-US" smtClean="0"/>
-              <a:t>8/30/2016</a:t>
+              <a:t>9/13/2016</a:t>
             </a:fld>
             <a:endParaRPr lang="en-US" sz="2000" dirty="0">
               <a:solidFill>
@@ -1312,7 +1314,7 @@
             <a:pPr eaLnBrk="1" latinLnBrk="0" hangingPunct="1"/>
             <a:fld id="{61D71F59-622D-49DD-A407-F9C971171EED}" type="datetime1">
               <a:rPr lang="en-US" smtClean="0"/>
-              <a:t>8/30/2016</a:t>
+              <a:t>9/13/2016</a:t>
             </a:fld>
             <a:endParaRPr lang="en-US" dirty="0"/>
           </a:p>
@@ -1494,7 +1496,7 @@
             <a:pPr eaLnBrk="1" latinLnBrk="0" hangingPunct="1"/>
             <a:fld id="{D732FB50-16D0-471D-8C85-B8A6C1DE6B65}" type="datetime1">
               <a:rPr lang="en-US" smtClean="0"/>
-              <a:t>8/30/2016</a:t>
+              <a:t>9/13/2016</a:t>
             </a:fld>
             <a:endParaRPr lang="en-US" dirty="0"/>
           </a:p>
@@ -1767,7 +1769,7 @@
             <a:pPr eaLnBrk="1" latinLnBrk="0" hangingPunct="1"/>
             <a:fld id="{466872B2-7238-4135-B3D9-97A1357E2E20}" type="datetime1">
               <a:rPr lang="en-US" smtClean="0"/>
-              <a:t>8/30/2016</a:t>
+              <a:t>9/13/2016</a:t>
             </a:fld>
             <a:endParaRPr lang="en-US" dirty="0"/>
           </a:p>
@@ -2210,7 +2212,7 @@
             <a:pPr eaLnBrk="1" latinLnBrk="0" hangingPunct="1"/>
             <a:fld id="{49DE1B7C-1FDD-42FD-9A06-6AC00313877F}" type="datetime1">
               <a:rPr lang="en-US" smtClean="0"/>
-              <a:t>8/30/2016</a:t>
+              <a:t>9/13/2016</a:t>
             </a:fld>
             <a:endParaRPr lang="en-US" dirty="0"/>
           </a:p>
@@ -2459,7 +2461,7 @@
             <a:pPr eaLnBrk="1" latinLnBrk="0" hangingPunct="1"/>
             <a:fld id="{537DA086-46E6-41E7-A73A-2CEE4966C500}" type="datetime1">
               <a:rPr lang="en-US" smtClean="0"/>
-              <a:t>8/30/2016</a:t>
+              <a:t>9/13/2016</a:t>
             </a:fld>
             <a:endParaRPr lang="en-US" dirty="0"/>
           </a:p>
@@ -2698,7 +2700,7 @@
             <a:pPr eaLnBrk="1" latinLnBrk="0" hangingPunct="1"/>
             <a:fld id="{3E9231E7-997A-412D-84DC-9B00410FEBC3}" type="datetime1">
               <a:rPr lang="en-US" smtClean="0"/>
-              <a:t>8/30/2016</a:t>
+              <a:t>9/13/2016</a:t>
             </a:fld>
             <a:endParaRPr lang="en-US" dirty="0"/>
           </a:p>
@@ -2896,7 +2898,7 @@
             <a:pPr eaLnBrk="1" latinLnBrk="0" hangingPunct="1"/>
             <a:fld id="{0FCB485A-B0BE-4563-90F2-538DF71CFB72}" type="datetime1">
               <a:rPr lang="en-US" smtClean="0"/>
-              <a:t>8/30/2016</a:t>
+              <a:t>9/13/2016</a:t>
             </a:fld>
             <a:endParaRPr lang="en-US" dirty="0"/>
           </a:p>
@@ -3000,7 +3002,7 @@
             <a:pPr eaLnBrk="1" latinLnBrk="0" hangingPunct="1"/>
             <a:fld id="{7673D3E5-681E-495A-9A20-B77690DC2AC4}" type="datetime1">
               <a:rPr lang="en-US" smtClean="0"/>
-              <a:t>8/30/2016</a:t>
+              <a:t>9/13/2016</a:t>
             </a:fld>
             <a:endParaRPr lang="en-US" dirty="0"/>
           </a:p>
@@ -3142,7 +3144,7 @@
             <a:pPr eaLnBrk="1" latinLnBrk="0" hangingPunct="1"/>
             <a:fld id="{36ADC30D-043F-4BA3-9E5F-DC13212B92AB}" type="datetime1">
               <a:rPr lang="en-US" smtClean="0"/>
-              <a:t>8/30/2016</a:t>
+              <a:t>9/13/2016</a:t>
             </a:fld>
             <a:endParaRPr lang="en-US" dirty="0"/>
           </a:p>
@@ -3661,7 +3663,7 @@
             <a:pPr eaLnBrk="1" latinLnBrk="0" hangingPunct="1"/>
             <a:fld id="{2A59F7D6-4F9A-47A6-ADCC-8BE2C05F1F8B}" type="datetime1">
               <a:rPr lang="en-US" smtClean="0"/>
-              <a:t>8/30/2016</a:t>
+              <a:t>9/13/2016</a:t>
             </a:fld>
             <a:endParaRPr lang="en-US" dirty="0"/>
           </a:p>
@@ -3925,7 +3927,7 @@
             <a:pPr eaLnBrk="1" latinLnBrk="0" hangingPunct="1"/>
             <a:fld id="{16C4A91E-8137-4654-B5C3-88E0D304AEC4}" type="datetime1">
               <a:rPr lang="en-US" smtClean="0"/>
-              <a:t>8/30/2016</a:t>
+              <a:t>9/13/2016</a:t>
             </a:fld>
             <a:endParaRPr lang="en-US" sz="1400" dirty="0">
               <a:solidFill>
@@ -4908,7 +4910,6 @@
               <a:rPr lang="en-US" dirty="0" smtClean="0"/>
               <a:t>Arguably most human-readable (explicit field names)</a:t>
             </a:r>
-            <a:endParaRPr lang="en-US" dirty="0" smtClean="0"/>
           </a:p>
           <a:p>
             <a:r>
@@ -6840,6 +6841,289 @@
 </p:sld>
 </file>
 
+<file path=ppt/slides/slide13.xml><?xml version="1.0" encoding="utf-8"?>
+<p:sld xmlns:a="http://schemas.openxmlformats.org/drawingml/2006/main" xmlns:r="http://schemas.openxmlformats.org/officeDocument/2006/relationships" xmlns:p="http://schemas.openxmlformats.org/presentationml/2006/main">
+  <p:cSld>
+    <p:spTree>
+      <p:nvGrpSpPr>
+        <p:cNvPr id="1" name=""/>
+        <p:cNvGrpSpPr/>
+        <p:nvPr/>
+      </p:nvGrpSpPr>
+      <p:grpSpPr>
+        <a:xfrm>
+          <a:off x="0" y="0"/>
+          <a:ext cx="0" cy="0"/>
+          <a:chOff x="0" y="0"/>
+          <a:chExt cx="0" cy="0"/>
+        </a:xfrm>
+      </p:grpSpPr>
+      <p:sp>
+        <p:nvSpPr>
+          <p:cNvPr id="2" name="Title 1"/>
+          <p:cNvSpPr>
+            <a:spLocks noGrp="1"/>
+          </p:cNvSpPr>
+          <p:nvPr>
+            <p:ph type="title"/>
+          </p:nvPr>
+        </p:nvSpPr>
+        <p:spPr/>
+        <p:txBody>
+          <a:bodyPr/>
+          <a:lstStyle/>
+          <a:p>
+            <a:r>
+              <a:rPr lang="en-US" dirty="0" smtClean="0"/>
+              <a:t>Decisions and Lessons Learned</a:t>
+            </a:r>
+            <a:endParaRPr lang="en-US" dirty="0"/>
+          </a:p>
+        </p:txBody>
+      </p:sp>
+      <p:sp>
+        <p:nvSpPr>
+          <p:cNvPr id="3" name="Slide Number Placeholder 2"/>
+          <p:cNvSpPr>
+            <a:spLocks noGrp="1"/>
+          </p:cNvSpPr>
+          <p:nvPr>
+            <p:ph type="sldNum" sz="quarter" idx="12"/>
+          </p:nvPr>
+        </p:nvSpPr>
+        <p:spPr/>
+        <p:txBody>
+          <a:bodyPr>
+            <a:normAutofit fontScale="85000" lnSpcReduction="20000"/>
+          </a:bodyPr>
+          <a:lstStyle/>
+          <a:p>
+            <a:fld id="{F43FF47F-E574-4450-810A-2029F5FBFFA6}" type="slidenum">
+              <a:rPr kumimoji="0" lang="en-US" smtClean="0"/>
+              <a:pPr/>
+              <a:t>13</a:t>
+            </a:fld>
+            <a:endParaRPr kumimoji="0" lang="en-US" dirty="0">
+              <a:solidFill>
+                <a:srgbClr val="FFFFFF"/>
+              </a:solidFill>
+            </a:endParaRPr>
+          </a:p>
+        </p:txBody>
+      </p:sp>
+      <p:sp>
+        <p:nvSpPr>
+          <p:cNvPr id="4" name="Content Placeholder 3"/>
+          <p:cNvSpPr>
+            <a:spLocks noGrp="1"/>
+          </p:cNvSpPr>
+          <p:nvPr>
+            <p:ph sz="quarter" idx="1"/>
+          </p:nvPr>
+        </p:nvSpPr>
+        <p:spPr/>
+        <p:txBody>
+          <a:bodyPr/>
+          <a:lstStyle/>
+          <a:p>
+            <a:r>
+              <a:rPr lang="en-US" dirty="0" smtClean="0"/>
+              <a:t>Distributed development (namespaces)</a:t>
+            </a:r>
+          </a:p>
+          <a:p>
+            <a:pPr lvl="1"/>
+            <a:r>
+              <a:rPr lang="en-US" dirty="0" smtClean="0"/>
+              <a:t>No generally-accepted namespace approach for JSON</a:t>
+            </a:r>
+          </a:p>
+          <a:p>
+            <a:pPr lvl="2"/>
+            <a:r>
+              <a:rPr lang="en-US" dirty="0" smtClean="0"/>
+              <a:t>Forced to roll our own to import both </a:t>
+            </a:r>
+            <a:r>
+              <a:rPr lang="en-US" dirty="0" err="1" smtClean="0"/>
+              <a:t>CybOX</a:t>
+            </a:r>
+            <a:r>
+              <a:rPr lang="en-US" dirty="0" smtClean="0"/>
+              <a:t> 2 and </a:t>
+            </a:r>
+            <a:r>
+              <a:rPr lang="en-US" dirty="0" err="1" smtClean="0"/>
+              <a:t>CybOX</a:t>
+            </a:r>
+            <a:r>
+              <a:rPr lang="en-US" dirty="0" smtClean="0"/>
+              <a:t> 3</a:t>
+            </a:r>
+          </a:p>
+          <a:p>
+            <a:r>
+              <a:rPr lang="en-US" dirty="0" smtClean="0"/>
+              <a:t>Balance between include and reference</a:t>
+            </a:r>
+          </a:p>
+          <a:p>
+            <a:pPr lvl="1"/>
+            <a:r>
+              <a:rPr lang="en-US" dirty="0" err="1" smtClean="0"/>
+              <a:t>CybOX</a:t>
+            </a:r>
+            <a:r>
+              <a:rPr lang="en-US" dirty="0" smtClean="0"/>
+              <a:t> 2 vs </a:t>
+            </a:r>
+            <a:r>
+              <a:rPr lang="en-US" dirty="0" err="1" smtClean="0"/>
+              <a:t>CybOX</a:t>
+            </a:r>
+            <a:r>
+              <a:rPr lang="en-US" dirty="0" smtClean="0"/>
+              <a:t> 3</a:t>
+            </a:r>
+          </a:p>
+          <a:p>
+            <a:r>
+              <a:rPr lang="en-US" dirty="0" smtClean="0"/>
+              <a:t>Think Abstract</a:t>
+            </a:r>
+          </a:p>
+          <a:p>
+            <a:pPr lvl="1"/>
+            <a:r>
+              <a:rPr lang="en-US" dirty="0" smtClean="0"/>
+              <a:t>Focus on what information is needed</a:t>
+            </a:r>
+          </a:p>
+          <a:p>
+            <a:pPr lvl="2"/>
+            <a:r>
+              <a:rPr lang="en-US" dirty="0" smtClean="0"/>
+              <a:t>Not how it is represented</a:t>
+            </a:r>
+            <a:endParaRPr lang="en-US" dirty="0"/>
+          </a:p>
+        </p:txBody>
+      </p:sp>
+    </p:spTree>
+    <p:extLst>
+      <p:ext uri="{BB962C8B-B14F-4D97-AF65-F5344CB8AC3E}">
+        <p14:creationId xmlns:p14="http://schemas.microsoft.com/office/powerpoint/2010/main" val="569221114"/>
+      </p:ext>
+    </p:extLst>
+  </p:cSld>
+  <p:clrMapOvr>
+    <a:masterClrMapping/>
+  </p:clrMapOvr>
+</p:sld>
+</file>
+
+<file path=ppt/slides/slide14.xml><?xml version="1.0" encoding="utf-8"?>
+<p:sld xmlns:a="http://schemas.openxmlformats.org/drawingml/2006/main" xmlns:r="http://schemas.openxmlformats.org/officeDocument/2006/relationships" xmlns:p="http://schemas.openxmlformats.org/presentationml/2006/main">
+  <p:cSld>
+    <p:spTree>
+      <p:nvGrpSpPr>
+        <p:cNvPr id="1" name=""/>
+        <p:cNvGrpSpPr/>
+        <p:nvPr/>
+      </p:nvGrpSpPr>
+      <p:grpSpPr>
+        <a:xfrm>
+          <a:off x="0" y="0"/>
+          <a:ext cx="0" cy="0"/>
+          <a:chOff x="0" y="0"/>
+          <a:chExt cx="0" cy="0"/>
+        </a:xfrm>
+      </p:grpSpPr>
+      <p:sp>
+        <p:nvSpPr>
+          <p:cNvPr id="2" name="Title 1"/>
+          <p:cNvSpPr>
+            <a:spLocks noGrp="1"/>
+          </p:cNvSpPr>
+          <p:nvPr>
+            <p:ph type="title"/>
+          </p:nvPr>
+        </p:nvSpPr>
+        <p:spPr/>
+        <p:txBody>
+          <a:bodyPr/>
+          <a:lstStyle/>
+          <a:p>
+            <a:r>
+              <a:rPr lang="en-US" smtClean="0"/>
+              <a:t>Next Steps</a:t>
+            </a:r>
+            <a:endParaRPr lang="en-US" dirty="0"/>
+          </a:p>
+        </p:txBody>
+      </p:sp>
+      <p:sp>
+        <p:nvSpPr>
+          <p:cNvPr id="3" name="Slide Number Placeholder 2"/>
+          <p:cNvSpPr>
+            <a:spLocks noGrp="1"/>
+          </p:cNvSpPr>
+          <p:nvPr>
+            <p:ph type="sldNum" sz="quarter" idx="12"/>
+          </p:nvPr>
+        </p:nvSpPr>
+        <p:spPr/>
+        <p:txBody>
+          <a:bodyPr>
+            <a:normAutofit fontScale="85000" lnSpcReduction="20000"/>
+          </a:bodyPr>
+          <a:lstStyle/>
+          <a:p>
+            <a:fld id="{F43FF47F-E574-4450-810A-2029F5FBFFA6}" type="slidenum">
+              <a:rPr kumimoji="0" lang="en-US" smtClean="0"/>
+              <a:pPr/>
+              <a:t>14</a:t>
+            </a:fld>
+            <a:endParaRPr kumimoji="0" lang="en-US" dirty="0">
+              <a:solidFill>
+                <a:srgbClr val="FFFFFF"/>
+              </a:solidFill>
+            </a:endParaRPr>
+          </a:p>
+        </p:txBody>
+      </p:sp>
+      <p:sp>
+        <p:nvSpPr>
+          <p:cNvPr id="4" name="Content Placeholder 3"/>
+          <p:cNvSpPr>
+            <a:spLocks noGrp="1"/>
+          </p:cNvSpPr>
+          <p:nvPr>
+            <p:ph sz="quarter" idx="1"/>
+          </p:nvPr>
+        </p:nvSpPr>
+        <p:spPr/>
+        <p:txBody>
+          <a:bodyPr/>
+          <a:lstStyle/>
+          <a:p>
+            <a:endParaRPr lang="en-US"/>
+          </a:p>
+        </p:txBody>
+      </p:sp>
+    </p:spTree>
+    <p:extLst>
+      <p:ext uri="{BB962C8B-B14F-4D97-AF65-F5344CB8AC3E}">
+        <p14:creationId xmlns:p14="http://schemas.microsoft.com/office/powerpoint/2010/main" val="3537432334"/>
+      </p:ext>
+    </p:extLst>
+  </p:cSld>
+  <p:clrMapOvr>
+    <a:masterClrMapping/>
+  </p:clrMapOvr>
+</p:sld>
+</file>
+
 <file path=ppt/slides/slide2.xml><?xml version="1.0" encoding="utf-8"?>
 <p:sld xmlns:a="http://schemas.openxmlformats.org/drawingml/2006/main" xmlns:r="http://schemas.openxmlformats.org/officeDocument/2006/relationships" xmlns:p="http://schemas.openxmlformats.org/presentationml/2006/main">
   <p:cSld>
@@ -7748,64 +8032,82 @@
           <a:p>
             <a:pPr lvl="1"/>
             <a:r>
-              <a:rPr lang="en-US" dirty="0">
+              <a:rPr lang="en-US" b="1" dirty="0" smtClean="0">
+                <a:solidFill>
+                  <a:srgbClr val="C00000"/>
+                </a:solidFill>
                 <a:latin typeface="Calibri" panose="020F0502020204030204" pitchFamily="34" charset="0"/>
               </a:rPr>
-              <a:t>Informal </a:t>
-            </a:r>
+              <a:t>Abstract </a:t>
+            </a:r>
+            <a:r>
+              <a:rPr lang="en-US" b="1" dirty="0" smtClean="0">
+                <a:solidFill>
+                  <a:srgbClr val="C00000"/>
+                </a:solidFill>
+                <a:latin typeface="Calibri" panose="020F0502020204030204" pitchFamily="34" charset="0"/>
+              </a:rPr>
+              <a:t>description</a:t>
+            </a:r>
+          </a:p>
+          <a:p>
+            <a:pPr lvl="2"/>
             <a:r>
               <a:rPr lang="en-US" dirty="0" smtClean="0">
                 <a:latin typeface="Calibri" panose="020F0502020204030204" pitchFamily="34" charset="0"/>
               </a:rPr>
-              <a:t>description of data objects</a:t>
-            </a:r>
-            <a:endParaRPr lang="en-US" dirty="0">
+              <a:t>Independent of serialization (XML, JSON, binary)</a:t>
+            </a:r>
+          </a:p>
+          <a:p>
+            <a:pPr lvl="1"/>
+            <a:r>
+              <a:rPr lang="en-US" dirty="0"/>
+              <a:t>Informal </a:t>
+            </a:r>
+            <a:r>
+              <a:rPr lang="en-US" dirty="0" smtClean="0"/>
+              <a:t>definition of </a:t>
+            </a:r>
+            <a:r>
+              <a:rPr lang="en-US" dirty="0"/>
+              <a:t>data objects</a:t>
+            </a:r>
+          </a:p>
+          <a:p>
+            <a:pPr lvl="2"/>
+            <a:r>
+              <a:rPr lang="en-US" dirty="0"/>
+              <a:t>Table cell contents follow conventions, but …</a:t>
+            </a:r>
+          </a:p>
+          <a:p>
+            <a:pPr lvl="2"/>
+            <a:r>
+              <a:rPr lang="en-US" dirty="0"/>
+              <a:t>Free-form text, cannot be machine parsed, validated, or </a:t>
+            </a:r>
+            <a:r>
+              <a:rPr lang="en-US" dirty="0" smtClean="0"/>
+              <a:t>translated</a:t>
+            </a:r>
+            <a:endParaRPr lang="en-US" dirty="0" smtClean="0">
               <a:latin typeface="Calibri" panose="020F0502020204030204" pitchFamily="34" charset="0"/>
             </a:endParaRPr>
           </a:p>
           <a:p>
-            <a:pPr lvl="2"/>
-            <a:r>
-              <a:rPr lang="en-US" dirty="0">
-                <a:latin typeface="Calibri" panose="020F0502020204030204" pitchFamily="34" charset="0"/>
-              </a:rPr>
-              <a:t>Table cell contents follow conventions, but …</a:t>
-            </a:r>
-          </a:p>
-          <a:p>
-            <a:pPr lvl="2"/>
-            <a:r>
-              <a:rPr lang="en-US" dirty="0">
-                <a:latin typeface="Calibri" panose="020F0502020204030204" pitchFamily="34" charset="0"/>
-              </a:rPr>
-              <a:t>Free-form text, cannot be machine parsed, validated, or translated</a:t>
-            </a:r>
-          </a:p>
-          <a:p>
             <a:pPr lvl="1"/>
             <a:r>
               <a:rPr lang="en-US" dirty="0" smtClean="0">
                 <a:latin typeface="Calibri" panose="020F0502020204030204" pitchFamily="34" charset="0"/>
               </a:rPr>
-              <a:t>Abstract description</a:t>
-            </a:r>
-          </a:p>
-          <a:p>
-            <a:pPr lvl="2"/>
+              <a:t>Interim </a:t>
+            </a:r>
             <a:r>
               <a:rPr lang="en-US" dirty="0" smtClean="0">
                 <a:latin typeface="Calibri" panose="020F0502020204030204" pitchFamily="34" charset="0"/>
               </a:rPr>
-              <a:t>Independent of serialization (XML, JSON, binary)</a:t>
-            </a:r>
-          </a:p>
-          <a:p>
-            <a:pPr lvl="1"/>
-            <a:r>
-              <a:rPr lang="en-US" dirty="0" smtClean="0">
-                <a:latin typeface="Calibri" panose="020F0502020204030204" pitchFamily="34" charset="0"/>
-              </a:rPr>
-              <a:t>Interim step toward formal abstract specifications?</a:t>
+              <a:t>step toward formal abstract specifications?</a:t>
             </a:r>
           </a:p>
           <a:p>
@@ -7955,6 +8257,47 @@
           </p:txBody>
         </p:sp>
       </p:grpSp>
+      <p:pic>
+        <p:nvPicPr>
+          <p:cNvPr id="1026" name="Picture 2" descr="C:\Users\dkemp\AppData\Local\Microsoft\Windows\Temporary Internet Files\Content.IE5\YEL755DK\1328101861_Thumbs_Up[1].png"/>
+          <p:cNvPicPr>
+            <a:picLocks noChangeAspect="1" noChangeArrowheads="1"/>
+          </p:cNvPicPr>
+          <p:nvPr/>
+        </p:nvPicPr>
+        <p:blipFill>
+          <a:blip r:embed="rId3" cstate="print">
+            <a:extLst>
+              <a:ext uri="{28A0092B-C50C-407E-A947-70E740481C1C}">
+                <a14:useLocalDpi xmlns:a14="http://schemas.microsoft.com/office/drawing/2010/main" val="0"/>
+              </a:ext>
+            </a:extLst>
+          </a:blip>
+          <a:srcRect/>
+          <a:stretch>
+            <a:fillRect/>
+          </a:stretch>
+        </p:blipFill>
+        <p:spPr bwMode="auto">
+          <a:xfrm>
+            <a:off x="3962400" y="2057400"/>
+            <a:ext cx="533400" cy="533400"/>
+          </a:xfrm>
+          <a:prstGeom prst="rect">
+            <a:avLst/>
+          </a:prstGeom>
+          <a:noFill/>
+          <a:extLst>
+            <a:ext uri="{909E8E84-426E-40DD-AFC4-6F175D3DCCD1}">
+              <a14:hiddenFill xmlns:a14="http://schemas.microsoft.com/office/drawing/2010/main">
+                <a:solidFill>
+                  <a:srgbClr val="FFFFFF"/>
+                </a:solidFill>
+              </a14:hiddenFill>
+            </a:ext>
+          </a:extLst>
+        </p:spPr>
+      </p:pic>
     </p:spTree>
     <p:extLst>
       <p:ext uri="{BB962C8B-B14F-4D97-AF65-F5344CB8AC3E}">
@@ -8932,15 +9275,7 @@
             <a:pPr lvl="2"/>
             <a:r>
               <a:rPr lang="en-US" dirty="0" smtClean="0"/>
-              <a:t>Item has </a:t>
-            </a:r>
-            <a:r>
-              <a:rPr lang="en-US" dirty="0" smtClean="0"/>
-              <a:t>position, </a:t>
-            </a:r>
-            <a:r>
-              <a:rPr lang="en-US" dirty="0" smtClean="0"/>
-              <a:t>no name</a:t>
+              <a:t>Item has position, no name</a:t>
             </a:r>
           </a:p>
           <a:p>
@@ -8954,13 +9289,8 @@
             <a:pPr lvl="2"/>
             <a:r>
               <a:rPr lang="en-US" dirty="0" smtClean="0"/>
-              <a:t>Property has name, no </a:t>
-            </a:r>
-            <a:r>
-              <a:rPr lang="en-US" dirty="0" smtClean="0"/>
-              <a:t>position</a:t>
-            </a:r>
-            <a:endParaRPr lang="en-US" dirty="0" smtClean="0"/>
+              <a:t>Property has name, no position</a:t>
+            </a:r>
           </a:p>
           <a:p>
             <a:r>
@@ -8979,13 +9309,8 @@
             <a:pPr lvl="2"/>
             <a:r>
               <a:rPr lang="en-US" dirty="0" smtClean="0"/>
-              <a:t>Field has both name and </a:t>
-            </a:r>
-            <a:r>
-              <a:rPr lang="en-US" dirty="0" smtClean="0"/>
-              <a:t>position</a:t>
-            </a:r>
-            <a:endParaRPr lang="en-US" dirty="0" smtClean="0"/>
+              <a:t>Field has both name and position</a:t>
+            </a:r>
           </a:p>
           <a:p>
             <a:pPr lvl="2"/>
@@ -9006,11 +9331,7 @@
             </a:r>
             <a:r>
               <a:rPr lang="en-US" dirty="0" smtClean="0"/>
-              <a:t>position</a:t>
-            </a:r>
-            <a:r>
-              <a:rPr lang="en-US" dirty="0" smtClean="0"/>
-              <a:t>s </a:t>
+              <a:t>positions </a:t>
             </a:r>
             <a:r>
               <a:rPr lang="en-US" dirty="0"/>
@@ -9032,13 +9353,8 @@
             <a:pPr lvl="2"/>
             <a:r>
               <a:rPr lang="en-US" dirty="0" smtClean="0"/>
-              <a:t>Field has name, no </a:t>
-            </a:r>
-            <a:r>
-              <a:rPr lang="en-US" dirty="0" smtClean="0"/>
-              <a:t>position</a:t>
-            </a:r>
-            <a:endParaRPr lang="en-US" dirty="0" smtClean="0"/>
+              <a:t>Field has name, no position</a:t>
+            </a:r>
           </a:p>
           <a:p>
             <a:pPr lvl="2"/>
@@ -9883,8 +10199,20 @@
             <a:pPr lvl="1"/>
             <a:r>
               <a:rPr lang="en-US" sz="1600" dirty="0" smtClean="0"/>
-              <a:t>Decoder supplies name corresponding to received ID</a:t>
-            </a:r>
+              <a:t>Decoder supplies name corresponding to received </a:t>
+            </a:r>
+            <a:r>
+              <a:rPr lang="en-US" sz="1600" dirty="0" smtClean="0"/>
+              <a:t>ID</a:t>
+            </a:r>
+          </a:p>
+          <a:p>
+            <a:pPr lvl="1"/>
+            <a:r>
+              <a:rPr lang="en-US" sz="1600" dirty="0" smtClean="0"/>
+              <a:t>Namespace needed to identify registry – IANA/IPFIX</a:t>
+            </a:r>
+            <a:endParaRPr lang="en-US" sz="1600" dirty="0" smtClean="0"/>
           </a:p>
         </p:txBody>
       </p:sp>
@@ -9896,7 +10224,7 @@
           </p:cNvPicPr>
           <p:nvPr/>
         </p:nvPicPr>
-        <p:blipFill>
+        <p:blipFill rotWithShape="1">
           <a:blip r:embed="rId3">
             <a:duotone>
               <a:prstClr val="black"/>
@@ -9911,14 +10239,13 @@
               </a:ext>
             </a:extLst>
           </a:blip>
-          <a:stretch>
-            <a:fillRect/>
-          </a:stretch>
+          <a:srcRect t="-1" b="15625"/>
+          <a:stretch/>
         </p:blipFill>
         <p:spPr>
           <a:xfrm>
-            <a:off x="473242" y="3193667"/>
-            <a:ext cx="8137358" cy="3359533"/>
+            <a:off x="473242" y="3566160"/>
+            <a:ext cx="8137358" cy="2834640"/>
           </a:xfrm>
           <a:prstGeom prst="rect">
             <a:avLst/>
@@ -9933,7 +10260,7 @@
         </p:nvSpPr>
         <p:spPr>
           <a:xfrm>
-            <a:off x="685800" y="3773904"/>
+            <a:off x="685800" y="4114800"/>
             <a:ext cx="1371600" cy="304800"/>
           </a:xfrm>
           <a:prstGeom prst="rect">

</xml_diff>